<commit_message>
Added latest version of UML and notes
</commit_message>
<xml_diff>
--- a/docs/B-Servis WebApp UI koncept.pptx
+++ b/docs/B-Servis WebApp UI koncept.pptx
@@ -258,7 +258,7 @@
             <a:fld id="{13D7BC02-97FB-40AD-9C57-F45A21FC8D54}" type="datetimeFigureOut">
               <a:rPr lang="sk-SK" smtClean="0"/>
               <a:pPr/>
-              <a:t>24. 7. 2021</a:t>
+              <a:t>20. 9. 2021</a:t>
             </a:fld>
             <a:endParaRPr lang="sk-SK"/>
           </a:p>
@@ -911,7 +911,7 @@
             <a:fld id="{009D66BC-8DF3-4F71-9F8B-CF7AD1EAA50D}" type="datetimeFigureOut">
               <a:rPr lang="sk-SK" smtClean="0"/>
               <a:pPr/>
-              <a:t>24. 7. 2021</a:t>
+              <a:t>20. 9. 2021</a:t>
             </a:fld>
             <a:endParaRPr lang="sk-SK"/>
           </a:p>
@@ -1081,7 +1081,7 @@
             <a:fld id="{009D66BC-8DF3-4F71-9F8B-CF7AD1EAA50D}" type="datetimeFigureOut">
               <a:rPr lang="sk-SK" smtClean="0"/>
               <a:pPr/>
-              <a:t>24. 7. 2021</a:t>
+              <a:t>20. 9. 2021</a:t>
             </a:fld>
             <a:endParaRPr lang="sk-SK"/>
           </a:p>
@@ -1261,7 +1261,7 @@
             <a:fld id="{009D66BC-8DF3-4F71-9F8B-CF7AD1EAA50D}" type="datetimeFigureOut">
               <a:rPr lang="sk-SK" smtClean="0"/>
               <a:pPr/>
-              <a:t>24. 7. 2021</a:t>
+              <a:t>20. 9. 2021</a:t>
             </a:fld>
             <a:endParaRPr lang="sk-SK"/>
           </a:p>
@@ -1431,7 +1431,7 @@
             <a:fld id="{009D66BC-8DF3-4F71-9F8B-CF7AD1EAA50D}" type="datetimeFigureOut">
               <a:rPr lang="sk-SK" smtClean="0"/>
               <a:pPr/>
-              <a:t>24. 7. 2021</a:t>
+              <a:t>20. 9. 2021</a:t>
             </a:fld>
             <a:endParaRPr lang="sk-SK"/>
           </a:p>
@@ -1678,7 +1678,7 @@
             <a:fld id="{009D66BC-8DF3-4F71-9F8B-CF7AD1EAA50D}" type="datetimeFigureOut">
               <a:rPr lang="sk-SK" smtClean="0"/>
               <a:pPr/>
-              <a:t>24. 7. 2021</a:t>
+              <a:t>20. 9. 2021</a:t>
             </a:fld>
             <a:endParaRPr lang="sk-SK"/>
           </a:p>
@@ -1909,7 +1909,7 @@
             <a:fld id="{009D66BC-8DF3-4F71-9F8B-CF7AD1EAA50D}" type="datetimeFigureOut">
               <a:rPr lang="sk-SK" smtClean="0"/>
               <a:pPr/>
-              <a:t>24. 7. 2021</a:t>
+              <a:t>20. 9. 2021</a:t>
             </a:fld>
             <a:endParaRPr lang="sk-SK"/>
           </a:p>
@@ -2275,7 +2275,7 @@
             <a:fld id="{009D66BC-8DF3-4F71-9F8B-CF7AD1EAA50D}" type="datetimeFigureOut">
               <a:rPr lang="sk-SK" smtClean="0"/>
               <a:pPr/>
-              <a:t>24. 7. 2021</a:t>
+              <a:t>20. 9. 2021</a:t>
             </a:fld>
             <a:endParaRPr lang="sk-SK"/>
           </a:p>
@@ -2394,7 +2394,7 @@
             <a:fld id="{009D66BC-8DF3-4F71-9F8B-CF7AD1EAA50D}" type="datetimeFigureOut">
               <a:rPr lang="sk-SK" smtClean="0"/>
               <a:pPr/>
-              <a:t>24. 7. 2021</a:t>
+              <a:t>20. 9. 2021</a:t>
             </a:fld>
             <a:endParaRPr lang="sk-SK"/>
           </a:p>
@@ -2491,7 +2491,7 @@
             <a:fld id="{009D66BC-8DF3-4F71-9F8B-CF7AD1EAA50D}" type="datetimeFigureOut">
               <a:rPr lang="sk-SK" smtClean="0"/>
               <a:pPr/>
-              <a:t>24. 7. 2021</a:t>
+              <a:t>20. 9. 2021</a:t>
             </a:fld>
             <a:endParaRPr lang="sk-SK"/>
           </a:p>
@@ -2768,7 +2768,7 @@
             <a:fld id="{009D66BC-8DF3-4F71-9F8B-CF7AD1EAA50D}" type="datetimeFigureOut">
               <a:rPr lang="sk-SK" smtClean="0"/>
               <a:pPr/>
-              <a:t>24. 7. 2021</a:t>
+              <a:t>20. 9. 2021</a:t>
             </a:fld>
             <a:endParaRPr lang="sk-SK"/>
           </a:p>
@@ -3022,7 +3022,7 @@
             <a:fld id="{009D66BC-8DF3-4F71-9F8B-CF7AD1EAA50D}" type="datetimeFigureOut">
               <a:rPr lang="sk-SK" smtClean="0"/>
               <a:pPr/>
-              <a:t>24. 7. 2021</a:t>
+              <a:t>20. 9. 2021</a:t>
             </a:fld>
             <a:endParaRPr lang="sk-SK"/>
           </a:p>
@@ -3235,7 +3235,7 @@
             <a:fld id="{009D66BC-8DF3-4F71-9F8B-CF7AD1EAA50D}" type="datetimeFigureOut">
               <a:rPr lang="sk-SK" smtClean="0"/>
               <a:pPr/>
-              <a:t>24. 7. 2021</a:t>
+              <a:t>20. 9. 2021</a:t>
             </a:fld>
             <a:endParaRPr lang="sk-SK"/>
           </a:p>
@@ -9991,6 +9991,83 @@
           </a:extLst>
         </p:spPr>
       </p:pic>
+      <p:sp>
+        <p:nvSpPr>
+          <p:cNvPr id="6" name="TextBox 5">
+            <a:extLst>
+              <a:ext uri="{FF2B5EF4-FFF2-40B4-BE49-F238E27FC236}">
+                <a16:creationId xmlns:a16="http://schemas.microsoft.com/office/drawing/2014/main" id="{0A2D3282-388C-4541-A8B6-EA15FE263838}"/>
+              </a:ext>
+            </a:extLst>
+          </p:cNvPr>
+          <p:cNvSpPr txBox="1"/>
+          <p:nvPr/>
+        </p:nvSpPr>
+        <p:spPr>
+          <a:xfrm>
+            <a:off x="5817428" y="6228592"/>
+            <a:ext cx="3218445" cy="369332"/>
+          </a:xfrm>
+          <a:prstGeom prst="rect">
+            <a:avLst/>
+          </a:prstGeom>
+          <a:noFill/>
+        </p:spPr>
+        <p:txBody>
+          <a:bodyPr wrap="none" rtlCol="0">
+            <a:spAutoFit/>
+          </a:bodyPr>
+          <a:lstStyle/>
+          <a:p>
+            <a:r>
+              <a:rPr lang="sk-SK" dirty="0"/>
+              <a:t>Okrem Mesta aj Ulica a č. Domu.</a:t>
+            </a:r>
+          </a:p>
+        </p:txBody>
+      </p:sp>
+      <p:cxnSp>
+        <p:nvCxnSpPr>
+          <p:cNvPr id="14" name="Straight Arrow Connector 13">
+            <a:extLst>
+              <a:ext uri="{FF2B5EF4-FFF2-40B4-BE49-F238E27FC236}">
+                <a16:creationId xmlns:a16="http://schemas.microsoft.com/office/drawing/2014/main" id="{DDE2A27E-54BD-4426-A691-9D4E15D3A964}"/>
+              </a:ext>
+            </a:extLst>
+          </p:cNvPr>
+          <p:cNvCxnSpPr>
+            <a:cxnSpLocks/>
+            <a:stCxn id="6" idx="0"/>
+          </p:cNvCxnSpPr>
+          <p:nvPr/>
+        </p:nvCxnSpPr>
+        <p:spPr>
+          <a:xfrm flipV="1">
+            <a:off x="7426651" y="5078028"/>
+            <a:ext cx="713625" cy="1150564"/>
+          </a:xfrm>
+          <a:prstGeom prst="straightConnector1">
+            <a:avLst/>
+          </a:prstGeom>
+          <a:ln>
+            <a:tailEnd type="triangle"/>
+          </a:ln>
+        </p:spPr>
+        <p:style>
+          <a:lnRef idx="1">
+            <a:schemeClr val="accent4"/>
+          </a:lnRef>
+          <a:fillRef idx="0">
+            <a:schemeClr val="accent4"/>
+          </a:fillRef>
+          <a:effectRef idx="0">
+            <a:schemeClr val="accent4"/>
+          </a:effectRef>
+          <a:fontRef idx="minor">
+            <a:schemeClr val="tx1"/>
+          </a:fontRef>
+        </p:style>
+      </p:cxnSp>
     </p:spTree>
     <p:extLst>
       <p:ext uri="{BB962C8B-B14F-4D97-AF65-F5344CB8AC3E}">

</xml_diff>